<commit_message>
Added images to video-02
</commit_message>
<xml_diff>
--- a/src/video-02-planning.pptx
+++ b/src/video-02-planning.pptx
@@ -34,6 +34,10 @@
     <p:sldId id="282" r:id="rId28"/>
     <p:sldId id="283" r:id="rId29"/>
     <p:sldId id="284" r:id="rId30"/>
+    <p:sldId id="285" r:id="rId31"/>
+    <p:sldId id="286" r:id="rId32"/>
+    <p:sldId id="287" r:id="rId33"/>
+    <p:sldId id="288" r:id="rId34"/>
   </p:sldIdLst>
   <p:sldSz cx="9144000" cy="6858000" type="screen4x3"/>
   <p:notesSz cx="6858000" cy="9144000"/>
@@ -3598,15 +3602,6 @@
               <a:t> . 2001.</a:t>
             </a:r>
           </a:p>
-          <a:p>
-            <a:pPr lvl="0" marL="0" indent="0">
-              <a:buNone/>
-            </a:pPr>
-            <a:r>
-              <a:rPr/>
-              <a:t>(assets/img/image2.jpeg)</a:t>
-            </a:r>
-          </a:p>
         </p:txBody>
       </p:sp>
     </p:spTree>
@@ -3631,106 +3626,36 @@
           <a:chExt cx="0" cy="0"/>
         </a:xfrm>
       </p:grpSpPr>
-      <p:sp>
-        <p:nvSpPr>
-          <p:cNvPr id="2" name="Title 1"/>
-          <p:cNvSpPr>
-            <a:spLocks noGrp="1"/>
-          </p:cNvSpPr>
-          <p:nvPr>
-            <p:ph type="title"/>
-          </p:nvPr>
-        </p:nvSpPr>
-        <p:spPr/>
-        <p:txBody>
-          <a:bodyPr/>
-          <a:lstStyle/>
-          <a:p>
-            <a:pPr lvl="0" marL="0" indent="0">
-              <a:buNone/>
-            </a:pPr>
-            <a:r>
-              <a:rPr/>
-              <a:t>Planning</a:t>
-            </a:r>
-            <a:r>
-              <a:rPr/>
-              <a:t> </a:t>
-            </a:r>
-            <a:r>
-              <a:rPr/>
-              <a:t>a</a:t>
-            </a:r>
-            <a:r>
-              <a:rPr/>
-              <a:t> </a:t>
-            </a:r>
-            <a:r>
-              <a:rPr/>
-              <a:t>Research</a:t>
-            </a:r>
-            <a:r>
-              <a:rPr/>
-              <a:t> </a:t>
-            </a:r>
-            <a:r>
-              <a:rPr/>
-              <a:t>Project</a:t>
-            </a:r>
-          </a:p>
-        </p:txBody>
-      </p:sp>
-      <p:sp>
-        <p:nvSpPr>
-          <p:cNvPr id="3" name="Content Placeholder 2"/>
-          <p:cNvSpPr>
-            <a:spLocks noGrp="1"/>
-          </p:cNvSpPr>
-          <p:nvPr>
-            <p:ph idx="1"/>
-          </p:nvPr>
-        </p:nvSpPr>
-        <p:spPr/>
-        <p:txBody>
-          <a:bodyPr/>
-          <a:lstStyle/>
-          <a:p>
-            <a:pPr lvl="1"/>
-            <a:r>
-              <a:rPr/>
-              <a:t>Step 2 ? Conduct literature review</a:t>
-            </a:r>
-          </a:p>
-          <a:p>
-            <a:pPr lvl="1"/>
-            <a:r>
-              <a:rPr/>
-              <a:t>Purposes of literature review</a:t>
-            </a:r>
-          </a:p>
-          <a:p>
-            <a:pPr lvl="1"/>
-            <a:r>
-              <a:rPr/>
-              <a:t>What a literature review is NOT ?</a:t>
-            </a:r>
-          </a:p>
-          <a:p>
-            <a:pPr lvl="1"/>
-            <a:r>
-              <a:rPr/>
-              <a:t>What a literature review is ?</a:t>
-            </a:r>
-          </a:p>
-          <a:p>
-            <a:pPr lvl="1"/>
-            <a:r>
-              <a:rPr/>
-              <a:t>Sources to be used in literature review</a:t>
-            </a:r>
-          </a:p>
-        </p:txBody>
-      </p:sp>
+      <p:pic>
+        <p:nvPicPr>
+          <p:cNvPr descr="../images/image-02-02.jpg" id="0" name="Picture 1"/>
+          <p:cNvPicPr>
+            <a:picLocks noGrp="1" noChangeAspect="1"/>
+          </p:cNvPicPr>
+          <p:nvPr/>
+        </p:nvPicPr>
+        <p:blipFill>
+          <a:blip r:embed="rId2"/>
+          <a:stretch>
+            <a:fillRect/>
+          </a:stretch>
+        </p:blipFill>
+        <p:spPr bwMode="auto">
+          <a:xfrm>
+            <a:off x="2463800" y="1600200"/>
+            <a:ext cx="4216400" cy="4521200"/>
+          </a:xfrm>
+          <a:prstGeom prst="rect">
+            <a:avLst/>
+          </a:prstGeom>
+          <a:noFill/>
+          <a:ln w="9525">
+            <a:noFill/>
+            <a:headEnd/>
+            <a:tailEnd/>
+          </a:ln>
+        </p:spPr>
+      </p:pic>
     </p:spTree>
   </p:cSld>
 </p:sld>
@@ -3820,63 +3745,35 @@
             <a:pPr lvl="1"/>
             <a:r>
               <a:rPr/>
-              <a:t>Reviewing the literature</a:t>
-            </a:r>
-          </a:p>
-          <a:p>
-            <a:pPr lvl="2"/>
-            <a:r>
-              <a:rPr/>
-              <a:t>What is known</a:t>
-            </a:r>
-          </a:p>
-          <a:p>
-            <a:pPr lvl="2"/>
-            <a:r>
-              <a:rPr/>
-              <a:t>What questions remain</a:t>
-            </a:r>
-          </a:p>
-          <a:p>
-            <a:pPr lvl="2"/>
-            <a:r>
-              <a:rPr/>
-              <a:t>Evaluating research reports</a:t>
-            </a:r>
-          </a:p>
-          <a:p>
-            <a:pPr lvl="3"/>
-            <a:r>
-              <a:rPr/>
-              <a:t>Journal quality</a:t>
-            </a:r>
-          </a:p>
-          <a:p>
-            <a:pPr lvl="3"/>
-            <a:r>
-              <a:rPr/>
-              <a:t>What is the study about?</a:t>
-            </a:r>
-          </a:p>
-          <a:p>
-            <a:pPr lvl="3"/>
-            <a:r>
-              <a:rPr/>
-              <a:t>Are the results of the study valid?</a:t>
-            </a:r>
-          </a:p>
-          <a:p>
-            <a:pPr lvl="3"/>
-            <a:r>
-              <a:rPr/>
-              <a:t>Are the results meaningful?</a:t>
-            </a:r>
-          </a:p>
-          <a:p>
-            <a:pPr lvl="3"/>
-            <a:r>
-              <a:rPr/>
-              <a:t>What does it all mean and how does it contribute to what you want to do?</a:t>
+              <a:t>Step 2 ? Conduct literature review</a:t>
+            </a:r>
+          </a:p>
+          <a:p>
+            <a:pPr lvl="1"/>
+            <a:r>
+              <a:rPr/>
+              <a:t>Purposes of literature review</a:t>
+            </a:r>
+          </a:p>
+          <a:p>
+            <a:pPr lvl="1"/>
+            <a:r>
+              <a:rPr/>
+              <a:t>What a literature review is NOT ?</a:t>
+            </a:r>
+          </a:p>
+          <a:p>
+            <a:pPr lvl="1"/>
+            <a:r>
+              <a:rPr/>
+              <a:t>What a literature review is ?</a:t>
+            </a:r>
+          </a:p>
+          <a:p>
+            <a:pPr lvl="1"/>
+            <a:r>
+              <a:rPr/>
+              <a:t>Sources to be used in literature review</a:t>
             </a:r>
           </a:p>
         </p:txBody>
@@ -3923,6 +3820,22 @@
             </a:pPr>
             <a:r>
               <a:rPr/>
+              <a:t>Planning</a:t>
+            </a:r>
+            <a:r>
+              <a:rPr/>
+              <a:t> </a:t>
+            </a:r>
+            <a:r>
+              <a:rPr/>
+              <a:t>a</a:t>
+            </a:r>
+            <a:r>
+              <a:rPr/>
+              <a:t> </a:t>
+            </a:r>
+            <a:r>
+              <a:rPr/>
               <a:t>Research</a:t>
             </a:r>
             <a:r>
@@ -3933,30 +3846,6 @@
               <a:rPr/>
               <a:t>Project</a:t>
             </a:r>
-            <a:r>
-              <a:rPr/>
-              <a:t> </a:t>
-            </a:r>
-            <a:r>
-              <a:rPr/>
-              <a:t>?</a:t>
-            </a:r>
-            <a:r>
-              <a:rPr/>
-              <a:t> </a:t>
-            </a:r>
-            <a:r>
-              <a:rPr/>
-              <a:t>Key</a:t>
-            </a:r>
-            <a:r>
-              <a:rPr/>
-              <a:t> </a:t>
-            </a:r>
-            <a:r>
-              <a:rPr/>
-              <a:t>Concepts</a:t>
-            </a:r>
           </a:p>
         </p:txBody>
       </p:sp>
@@ -3978,42 +3867,63 @@
             <a:pPr lvl="1"/>
             <a:r>
               <a:rPr/>
-              <a:t>Variables</a:t>
-            </a:r>
-          </a:p>
-          <a:p>
-            <a:pPr lvl="2"/>
-            <a:r>
-              <a:rPr/>
-              <a:t>Independent variables</a:t>
+              <a:t>Reviewing the literature</a:t>
+            </a:r>
+          </a:p>
+          <a:p>
+            <a:pPr lvl="2"/>
+            <a:r>
+              <a:rPr/>
+              <a:t>What is known</a:t>
+            </a:r>
+          </a:p>
+          <a:p>
+            <a:pPr lvl="2"/>
+            <a:r>
+              <a:rPr/>
+              <a:t>What questions remain</a:t>
+            </a:r>
+          </a:p>
+          <a:p>
+            <a:pPr lvl="2"/>
+            <a:r>
+              <a:rPr/>
+              <a:t>Evaluating research reports</a:t>
             </a:r>
           </a:p>
           <a:p>
             <a:pPr lvl="3"/>
             <a:r>
               <a:rPr/>
-              <a:t>Active or Manipulated</a:t>
+              <a:t>Journal quality</a:t>
             </a:r>
           </a:p>
           <a:p>
             <a:pPr lvl="3"/>
             <a:r>
               <a:rPr/>
-              <a:t>Attribute or Measured</a:t>
-            </a:r>
-          </a:p>
-          <a:p>
-            <a:pPr lvl="2"/>
-            <a:r>
-              <a:rPr/>
-              <a:t>Dependent variables</a:t>
-            </a:r>
-          </a:p>
-          <a:p>
-            <a:pPr lvl="2"/>
-            <a:r>
-              <a:rPr/>
-              <a:t>Extraneous variables</a:t>
+              <a:t>What is the study about?</a:t>
+            </a:r>
+          </a:p>
+          <a:p>
+            <a:pPr lvl="3"/>
+            <a:r>
+              <a:rPr/>
+              <a:t>Are the results of the study valid?</a:t>
+            </a:r>
+          </a:p>
+          <a:p>
+            <a:pPr lvl="3"/>
+            <a:r>
+              <a:rPr/>
+              <a:t>Are the results meaningful?</a:t>
+            </a:r>
+          </a:p>
+          <a:p>
+            <a:pPr lvl="3"/>
+            <a:r>
+              <a:rPr/>
+              <a:t>What does it all mean and how does it contribute to what you want to do?</a:t>
             </a:r>
           </a:p>
         </p:txBody>
@@ -4115,35 +4025,42 @@
             <a:pPr lvl="1"/>
             <a:r>
               <a:rPr/>
-              <a:t>Research Hypotheses vs Research Questions</a:t>
-            </a:r>
-          </a:p>
-          <a:p>
-            <a:pPr lvl="2"/>
-            <a:r>
-              <a:rPr/>
-              <a:t>Difference</a:t>
-            </a:r>
-          </a:p>
-          <a:p>
-            <a:pPr lvl="2"/>
-            <a:r>
-              <a:rPr/>
-              <a:t>Associational</a:t>
-            </a:r>
-          </a:p>
-          <a:p>
-            <a:pPr lvl="2"/>
-            <a:r>
-              <a:rPr/>
-              <a:t>Descriptive</a:t>
-            </a:r>
-          </a:p>
-          <a:p>
-            <a:pPr lvl="1"/>
-            <a:r>
-              <a:rPr/>
-              <a:t>Analyses associated with each type of RH/RQ</a:t>
+              <a:t>Variables</a:t>
+            </a:r>
+          </a:p>
+          <a:p>
+            <a:pPr lvl="2"/>
+            <a:r>
+              <a:rPr/>
+              <a:t>Independent variables</a:t>
+            </a:r>
+          </a:p>
+          <a:p>
+            <a:pPr lvl="3"/>
+            <a:r>
+              <a:rPr/>
+              <a:t>Active or Manipulated</a:t>
+            </a:r>
+          </a:p>
+          <a:p>
+            <a:pPr lvl="3"/>
+            <a:r>
+              <a:rPr/>
+              <a:t>Attribute or Measured</a:t>
+            </a:r>
+          </a:p>
+          <a:p>
+            <a:pPr lvl="2"/>
+            <a:r>
+              <a:rPr/>
+              <a:t>Dependent variables</a:t>
+            </a:r>
+          </a:p>
+          <a:p>
+            <a:pPr lvl="2"/>
+            <a:r>
+              <a:rPr/>
+              <a:t>Extraneous variables</a:t>
             </a:r>
           </a:p>
         </p:txBody>
@@ -4190,7 +4107,7 @@
             </a:pPr>
             <a:r>
               <a:rPr/>
-              <a:t>Clinical</a:t>
+              <a:t>Research</a:t>
             </a:r>
             <a:r>
               <a:rPr/>
@@ -4198,7 +4115,7 @@
             </a:r>
             <a:r>
               <a:rPr/>
-              <a:t>Research</a:t>
+              <a:t>Project</a:t>
             </a:r>
             <a:r>
               <a:rPr/>
@@ -4206,7 +4123,23 @@
             </a:r>
             <a:r>
               <a:rPr/>
-              <a:t>Introduction</a:t>
+              <a:t>?</a:t>
+            </a:r>
+            <a:r>
+              <a:rPr/>
+              <a:t> </a:t>
+            </a:r>
+            <a:r>
+              <a:rPr/>
+              <a:t>Key</a:t>
+            </a:r>
+            <a:r>
+              <a:rPr/>
+              <a:t> </a:t>
+            </a:r>
+            <a:r>
+              <a:rPr/>
+              <a:t>Concepts</a:t>
             </a:r>
           </a:p>
         </p:txBody>
@@ -4226,12 +4159,38 @@
           <a:bodyPr/>
           <a:lstStyle/>
           <a:p>
-            <a:pPr lvl="0" marL="0" indent="0">
-              <a:buNone/>
-            </a:pPr>
-            <a:r>
-              <a:rPr/>
-              <a:t>(assets/img/image3.emf)</a:t>
+            <a:pPr lvl="1"/>
+            <a:r>
+              <a:rPr/>
+              <a:t>Research Hypotheses vs Research Questions</a:t>
+            </a:r>
+          </a:p>
+          <a:p>
+            <a:pPr lvl="2"/>
+            <a:r>
+              <a:rPr/>
+              <a:t>Difference</a:t>
+            </a:r>
+          </a:p>
+          <a:p>
+            <a:pPr lvl="2"/>
+            <a:r>
+              <a:rPr/>
+              <a:t>Associational</a:t>
+            </a:r>
+          </a:p>
+          <a:p>
+            <a:pPr lvl="2"/>
+            <a:r>
+              <a:rPr/>
+              <a:t>Descriptive</a:t>
+            </a:r>
+          </a:p>
+          <a:p>
+            <a:pPr lvl="1"/>
+            <a:r>
+              <a:rPr/>
+              <a:t>Analyses associated with each type of RH/RQ</a:t>
             </a:r>
           </a:p>
         </p:txBody>
@@ -4278,6 +4237,14 @@
             </a:pPr>
             <a:r>
               <a:rPr/>
+              <a:t>Clinical</a:t>
+            </a:r>
+            <a:r>
+              <a:rPr/>
+              <a:t> </a:t>
+            </a:r>
+            <a:r>
+              <a:rPr/>
               <a:t>Research</a:t>
             </a:r>
             <a:r>
@@ -4286,69 +4253,41 @@
             </a:r>
             <a:r>
               <a:rPr/>
-              <a:t>Ethics</a:t>
-            </a:r>
-          </a:p>
-        </p:txBody>
-      </p:sp>
-      <p:sp>
-        <p:nvSpPr>
-          <p:cNvPr id="3" name="Content Placeholder 2"/>
-          <p:cNvSpPr>
-            <a:spLocks noGrp="1"/>
-          </p:cNvSpPr>
-          <p:nvPr>
-            <p:ph idx="1"/>
-          </p:nvPr>
-        </p:nvSpPr>
-        <p:spPr/>
-        <p:txBody>
-          <a:bodyPr/>
-          <a:lstStyle/>
-          <a:p>
-            <a:pPr lvl="1"/>
-            <a:r>
-              <a:rPr/>
-              <a:t>Basic sources of research ethics</a:t>
-            </a:r>
-          </a:p>
-          <a:p>
-            <a:pPr lvl="2"/>
-            <a:r>
-              <a:rPr/>
-              <a:t>Professional codes</a:t>
-            </a:r>
-          </a:p>
-          <a:p>
-            <a:pPr lvl="2"/>
-            <a:r>
-              <a:rPr/>
-              <a:t>Government regulations</a:t>
-            </a:r>
-          </a:p>
-          <a:p>
-            <a:pPr lvl="2"/>
-            <a:r>
-              <a:rPr/>
-              <a:t>Institutional policies</a:t>
-            </a:r>
-          </a:p>
-          <a:p>
-            <a:pPr lvl="2"/>
-            <a:r>
-              <a:rPr/>
-              <a:t>Personal convictions and responsibility</a:t>
-            </a:r>
-          </a:p>
-          <a:p>
-            <a:pPr lvl="2"/>
-            <a:r>
-              <a:rPr/>
-              <a:t>Mentors</a:t>
-            </a:r>
-          </a:p>
-        </p:txBody>
-      </p:sp>
+              <a:t>Introduction</a:t>
+            </a:r>
+          </a:p>
+        </p:txBody>
+      </p:sp>
+      <p:pic>
+        <p:nvPicPr>
+          <p:cNvPr descr="../images/image-02-03.png" id="0" name="Picture 1"/>
+          <p:cNvPicPr>
+            <a:picLocks noGrp="1" noChangeAspect="1"/>
+          </p:cNvPicPr>
+          <p:nvPr/>
+        </p:nvPicPr>
+        <p:blipFill>
+          <a:blip r:embed="rId2"/>
+          <a:stretch>
+            <a:fillRect/>
+          </a:stretch>
+        </p:blipFill>
+        <p:spPr bwMode="auto">
+          <a:xfrm>
+            <a:off x="1879600" y="1600200"/>
+            <a:ext cx="5384800" cy="4521200"/>
+          </a:xfrm>
+          <a:prstGeom prst="rect">
+            <a:avLst/>
+          </a:prstGeom>
+          <a:noFill/>
+          <a:ln w="9525">
+            <a:noFill/>
+            <a:headEnd/>
+            <a:tailEnd/>
+          </a:ln>
+        </p:spPr>
+      </p:pic>
     </p:spTree>
   </p:cSld>
 </p:sld>
@@ -4422,56 +4361,42 @@
             <a:pPr lvl="1"/>
             <a:r>
               <a:rPr/>
-              <a:t>Integrity of the researcher</a:t>
-            </a:r>
-          </a:p>
-          <a:p>
-            <a:pPr lvl="2"/>
-            <a:r>
-              <a:rPr/>
-              <a:t>?The buck stops here?</a:t>
-            </a:r>
-          </a:p>
-          <a:p>
-            <a:pPr lvl="1"/>
-            <a:r>
-              <a:rPr/>
-              <a:t>Protection of human rights in clinical research</a:t>
-            </a:r>
-          </a:p>
-          <a:p>
-            <a:pPr lvl="2"/>
-            <a:r>
-              <a:rPr/>
-              <a:t>Guiding Principles (Belmont Report)</a:t>
-            </a:r>
-          </a:p>
-          <a:p>
-            <a:pPr lvl="3"/>
-            <a:r>
-              <a:rPr/>
-              <a:t>Autonomy of each individual</a:t>
-            </a:r>
-          </a:p>
-          <a:p>
-            <a:pPr lvl="3"/>
-            <a:r>
-              <a:rPr/>
-              <a:t>Beneficence</a:t>
-            </a:r>
-          </a:p>
-          <a:p>
-            <a:pPr lvl="3"/>
-            <a:r>
-              <a:rPr/>
-              <a:t>Justice</a:t>
-            </a:r>
-          </a:p>
-          <a:p>
-            <a:pPr lvl="2"/>
-            <a:r>
-              <a:rPr/>
-              <a:t>Use of control groups</a:t>
+              <a:t>Basic sources of research ethics</a:t>
+            </a:r>
+          </a:p>
+          <a:p>
+            <a:pPr lvl="2"/>
+            <a:r>
+              <a:rPr/>
+              <a:t>Professional codes</a:t>
+            </a:r>
+          </a:p>
+          <a:p>
+            <a:pPr lvl="2"/>
+            <a:r>
+              <a:rPr/>
+              <a:t>Government regulations</a:t>
+            </a:r>
+          </a:p>
+          <a:p>
+            <a:pPr lvl="2"/>
+            <a:r>
+              <a:rPr/>
+              <a:t>Institutional policies</a:t>
+            </a:r>
+          </a:p>
+          <a:p>
+            <a:pPr lvl="2"/>
+            <a:r>
+              <a:rPr/>
+              <a:t>Personal convictions and responsibility</a:t>
+            </a:r>
+          </a:p>
+          <a:p>
+            <a:pPr lvl="2"/>
+            <a:r>
+              <a:rPr/>
+              <a:t>Mentors</a:t>
             </a:r>
           </a:p>
         </p:txBody>
@@ -4647,56 +4572,56 @@
             <a:pPr lvl="1"/>
             <a:r>
               <a:rPr/>
-              <a:t>Central issues in research ethics</a:t>
-            </a:r>
-          </a:p>
-          <a:p>
-            <a:pPr lvl="2"/>
-            <a:r>
-              <a:rPr/>
-              <a:t>Informed consent</a:t>
-            </a:r>
-          </a:p>
-          <a:p>
-            <a:pPr lvl="2"/>
-            <a:r>
-              <a:rPr/>
-              <a:t>Privacy and confidentiality</a:t>
-            </a:r>
-          </a:p>
-          <a:p>
-            <a:pPr lvl="2"/>
-            <a:r>
-              <a:rPr/>
-              <a:t>Anonymity</a:t>
-            </a:r>
-          </a:p>
-          <a:p>
-            <a:pPr lvl="2"/>
-            <a:r>
-              <a:rPr/>
-              <a:t>Deception</a:t>
-            </a:r>
-          </a:p>
-          <a:p>
-            <a:pPr lvl="2"/>
-            <a:r>
-              <a:rPr/>
-              <a:t>Risk of harm</a:t>
-            </a:r>
-          </a:p>
-          <a:p>
-            <a:pPr lvl="2"/>
-            <a:r>
-              <a:rPr/>
-              <a:t>Exploitation</a:t>
+              <a:t>Integrity of the researcher</a:t>
+            </a:r>
+          </a:p>
+          <a:p>
+            <a:pPr lvl="2"/>
+            <a:r>
+              <a:rPr/>
+              <a:t>?The buck stops here?</a:t>
             </a:r>
           </a:p>
           <a:p>
             <a:pPr lvl="1"/>
             <a:r>
               <a:rPr/>
-              <a:t>Vulnerable populations</a:t>
+              <a:t>Protection of human rights in clinical research</a:t>
+            </a:r>
+          </a:p>
+          <a:p>
+            <a:pPr lvl="2"/>
+            <a:r>
+              <a:rPr/>
+              <a:t>Guiding Principles (Belmont Report)</a:t>
+            </a:r>
+          </a:p>
+          <a:p>
+            <a:pPr lvl="3"/>
+            <a:r>
+              <a:rPr/>
+              <a:t>Autonomy of each individual</a:t>
+            </a:r>
+          </a:p>
+          <a:p>
+            <a:pPr lvl="3"/>
+            <a:r>
+              <a:rPr/>
+              <a:t>Beneficence</a:t>
+            </a:r>
+          </a:p>
+          <a:p>
+            <a:pPr lvl="3"/>
+            <a:r>
+              <a:rPr/>
+              <a:t>Justice</a:t>
+            </a:r>
+          </a:p>
+          <a:p>
+            <a:pPr lvl="2"/>
+            <a:r>
+              <a:rPr/>
+              <a:t>Use of control groups</a:t>
             </a:r>
           </a:p>
         </p:txBody>
@@ -4771,29 +4696,59 @@
           <a:bodyPr/>
           <a:lstStyle/>
           <a:p>
-            <a:pPr lvl="0" marL="0" indent="0">
-              <a:buNone/>
-            </a:pPr>
-            <a:r>
-              <a:rPr/>
-              <a:t>Sim &amp; Wright. </a:t>
-            </a:r>
-            <a:r>
-              <a:rPr i="1"/>
-              <a:t>Research in Health Care</a:t>
-            </a:r>
-            <a:r>
-              <a:rPr/>
-              <a:t> . 2000.</a:t>
-            </a:r>
-          </a:p>
-          <a:p>
-            <a:pPr lvl="0" marL="0" indent="0">
-              <a:buNone/>
-            </a:pPr>
-            <a:r>
-              <a:rPr/>
-              <a:t>MEDB 5510 - Week 2 Part 2 - Gerkovich </a:t>
+            <a:pPr lvl="1"/>
+            <a:r>
+              <a:rPr/>
+              <a:t>Central issues in research ethics</a:t>
+            </a:r>
+          </a:p>
+          <a:p>
+            <a:pPr lvl="2"/>
+            <a:r>
+              <a:rPr/>
+              <a:t>Informed consent</a:t>
+            </a:r>
+          </a:p>
+          <a:p>
+            <a:pPr lvl="2"/>
+            <a:r>
+              <a:rPr/>
+              <a:t>Privacy and confidentiality</a:t>
+            </a:r>
+          </a:p>
+          <a:p>
+            <a:pPr lvl="2"/>
+            <a:r>
+              <a:rPr/>
+              <a:t>Anonymity</a:t>
+            </a:r>
+          </a:p>
+          <a:p>
+            <a:pPr lvl="2"/>
+            <a:r>
+              <a:rPr/>
+              <a:t>Deception</a:t>
+            </a:r>
+          </a:p>
+          <a:p>
+            <a:pPr lvl="2"/>
+            <a:r>
+              <a:rPr/>
+              <a:t>Risk of harm</a:t>
+            </a:r>
+          </a:p>
+          <a:p>
+            <a:pPr lvl="2"/>
+            <a:r>
+              <a:rPr/>
+              <a:t>Exploitation</a:t>
+            </a:r>
+          </a:p>
+          <a:p>
+            <a:pPr lvl="1"/>
+            <a:r>
+              <a:rPr/>
+              <a:t>Vulnerable populations</a:t>
             </a:r>
           </a:p>
         </p:txBody>
@@ -4868,59 +4823,20 @@
           <a:bodyPr/>
           <a:lstStyle/>
           <a:p>
-            <a:pPr lvl="1"/>
-            <a:r>
-              <a:rPr/>
-              <a:t>Institutional Review Board</a:t>
-            </a:r>
-          </a:p>
-          <a:p>
-            <a:pPr lvl="2"/>
-            <a:r>
-              <a:rPr/>
-              <a:t>Purpose</a:t>
-            </a:r>
-          </a:p>
-          <a:p>
-            <a:pPr lvl="2"/>
-            <a:r>
-              <a:rPr/>
-              <a:t>Composition</a:t>
-            </a:r>
-          </a:p>
-          <a:p>
-            <a:pPr lvl="2"/>
-            <a:r>
-              <a:rPr/>
-              <a:t>Responsibilities</a:t>
-            </a:r>
-          </a:p>
-          <a:p>
-            <a:pPr lvl="1"/>
-            <a:r>
-              <a:rPr/>
-              <a:t>Elements of Informed Consent</a:t>
-            </a:r>
-          </a:p>
-          <a:p>
-            <a:pPr lvl="2"/>
-            <a:r>
-              <a:rPr/>
-              <a:t>Information elements</a:t>
-            </a:r>
-          </a:p>
-          <a:p>
-            <a:pPr lvl="2"/>
-            <a:r>
-              <a:rPr/>
-              <a:t>Consent elements</a:t>
-            </a:r>
-          </a:p>
-          <a:p>
-            <a:pPr lvl="2"/>
-            <a:r>
-              <a:rPr/>
-              <a:t>Authorization</a:t>
+            <a:pPr lvl="0" marL="0" indent="0">
+              <a:buNone/>
+            </a:pPr>
+            <a:r>
+              <a:rPr/>
+              <a:t>Sim &amp; Wright. </a:t>
+            </a:r>
+            <a:r>
+              <a:rPr i="1"/>
+              <a:t>Research in Health Care</a:t>
+            </a:r>
+            <a:r>
+              <a:rPr/>
+              <a:t> . 2000.</a:t>
             </a:r>
           </a:p>
         </p:txBody>
@@ -4947,136 +4863,36 @@
           <a:chExt cx="0" cy="0"/>
         </a:xfrm>
       </p:grpSpPr>
-      <p:sp>
-        <p:nvSpPr>
-          <p:cNvPr id="2" name="Title 1"/>
-          <p:cNvSpPr>
-            <a:spLocks noGrp="1"/>
-          </p:cNvSpPr>
-          <p:nvPr>
-            <p:ph type="title"/>
-          </p:nvPr>
-        </p:nvSpPr>
-        <p:spPr/>
-        <p:txBody>
-          <a:bodyPr/>
-          <a:lstStyle/>
-          <a:p>
-            <a:pPr lvl="0" marL="0" indent="0">
-              <a:buNone/>
-            </a:pPr>
-            <a:r>
-              <a:rPr/>
-              <a:t>Research</a:t>
-            </a:r>
-            <a:r>
-              <a:rPr/>
-              <a:t> </a:t>
-            </a:r>
-            <a:r>
-              <a:rPr/>
-              <a:t>Ethics</a:t>
-            </a:r>
-          </a:p>
-        </p:txBody>
-      </p:sp>
-      <p:sp>
-        <p:nvSpPr>
-          <p:cNvPr id="3" name="Content Placeholder 2"/>
-          <p:cNvSpPr>
-            <a:spLocks noGrp="1"/>
-          </p:cNvSpPr>
-          <p:nvPr>
-            <p:ph idx="1"/>
-          </p:nvPr>
-        </p:nvSpPr>
-        <p:spPr/>
-        <p:txBody>
-          <a:bodyPr/>
-          <a:lstStyle/>
-          <a:p>
-            <a:pPr lvl="0" marL="0" indent="0">
-              <a:buNone/>
-            </a:pPr>
-            <a:r>
-              <a:rPr/>
-              <a:t>Portney &amp; Watkins, 2009.</a:t>
-            </a:r>
-          </a:p>
-          <a:p>
-            <a:pPr lvl="0" marL="0" indent="0">
-              <a:buNone/>
-            </a:pPr>
-            <a:r>
-              <a:rPr/>
-              <a:t>(assets/img/image2.jpeg) *** ### Research Ethics</a:t>
-            </a:r>
-          </a:p>
-          <a:p>
-            <a:pPr lvl="1"/>
-            <a:r>
-              <a:rPr/>
-              <a:t>Other research ethics issues</a:t>
-            </a:r>
-          </a:p>
-          <a:p>
-            <a:pPr lvl="2"/>
-            <a:r>
-              <a:rPr/>
-              <a:t>Scientific misconduct</a:t>
-            </a:r>
-          </a:p>
-          <a:p>
-            <a:pPr lvl="2"/>
-            <a:r>
-              <a:rPr/>
-              <a:t>Conflict of interest</a:t>
-            </a:r>
-          </a:p>
-          <a:p>
-            <a:pPr lvl="2"/>
-            <a:r>
-              <a:rPr/>
-              <a:t>Reporting research results</a:t>
-            </a:r>
-          </a:p>
-          <a:p>
-            <a:pPr lvl="3"/>
-            <a:r>
-              <a:rPr/>
-              <a:t>Plagiarism</a:t>
-            </a:r>
-          </a:p>
-          <a:p>
-            <a:pPr lvl="3"/>
-            <a:r>
-              <a:rPr/>
-              <a:t>Duplication</a:t>
-            </a:r>
-          </a:p>
-          <a:p>
-            <a:pPr lvl="3"/>
-            <a:r>
-              <a:rPr/>
-              <a:t>Fragmentation</a:t>
-            </a:r>
-          </a:p>
-          <a:p>
-            <a:pPr lvl="3"/>
-            <a:r>
-              <a:rPr/>
-              <a:t>Authorship</a:t>
-            </a:r>
-          </a:p>
-          <a:p>
-            <a:pPr lvl="2"/>
-            <a:r>
-              <a:rPr/>
-              <a:t>Use of animals in research</a:t>
-            </a:r>
-          </a:p>
-        </p:txBody>
-      </p:sp>
+      <p:pic>
+        <p:nvPicPr>
+          <p:cNvPr descr="../images/image-02-04.png" id="0" name="Picture 1"/>
+          <p:cNvPicPr>
+            <a:picLocks noGrp="1" noChangeAspect="1"/>
+          </p:cNvPicPr>
+          <p:nvPr/>
+        </p:nvPicPr>
+        <p:blipFill>
+          <a:blip r:embed="rId2"/>
+          <a:stretch>
+            <a:fillRect/>
+          </a:stretch>
+        </p:blipFill>
+        <p:spPr bwMode="auto">
+          <a:xfrm>
+            <a:off x="939800" y="1600200"/>
+            <a:ext cx="7277100" cy="4521200"/>
+          </a:xfrm>
+          <a:prstGeom prst="rect">
+            <a:avLst/>
+          </a:prstGeom>
+          <a:noFill/>
+          <a:ln w="9525">
+            <a:noFill/>
+            <a:headEnd/>
+            <a:tailEnd/>
+          </a:ln>
+        </p:spPr>
+      </p:pic>
     </p:spTree>
   </p:cSld>
 </p:sld>
@@ -5150,35 +4966,56 @@
             <a:pPr lvl="1"/>
             <a:r>
               <a:rPr/>
-              <a:t>NIH definition (NIH Catalyst, 2001)</a:t>
+              <a:t>Institutional Review Board</a:t>
+            </a:r>
+          </a:p>
+          <a:p>
+            <a:pPr lvl="2"/>
+            <a:r>
+              <a:rPr/>
+              <a:t>Purpose</a:t>
+            </a:r>
+          </a:p>
+          <a:p>
+            <a:pPr lvl="2"/>
+            <a:r>
+              <a:rPr/>
+              <a:t>Composition</a:t>
+            </a:r>
+          </a:p>
+          <a:p>
+            <a:pPr lvl="2"/>
+            <a:r>
+              <a:rPr/>
+              <a:t>Responsibilities</a:t>
             </a:r>
           </a:p>
           <a:p>
             <a:pPr lvl="1"/>
             <a:r>
               <a:rPr/>
-              <a:t>Scientific/research misconduct is ?</a:t>
-            </a:r>
-          </a:p>
-          <a:p>
-            <a:pPr lvl="2"/>
-            <a:r>
-              <a:rPr/>
-              <a:t>Fabrication ? inventing data or results</a:t>
-            </a:r>
-          </a:p>
-          <a:p>
-            <a:pPr lvl="2"/>
-            <a:r>
-              <a:rPr/>
-              <a:t>Falsification ? manipulating research materials, equipment, or processes, or changing or omitting data or results</a:t>
-            </a:r>
-          </a:p>
-          <a:p>
-            <a:pPr lvl="2"/>
-            <a:r>
-              <a:rPr/>
-              <a:t>Plagiarism ? appropriation of ideas, processes, results, or words of another person without giving appropriate credit</a:t>
+              <a:t>Elements of Informed Consent</a:t>
+            </a:r>
+          </a:p>
+          <a:p>
+            <a:pPr lvl="2"/>
+            <a:r>
+              <a:rPr/>
+              <a:t>Information elements</a:t>
+            </a:r>
+          </a:p>
+          <a:p>
+            <a:pPr lvl="2"/>
+            <a:r>
+              <a:rPr/>
+              <a:t>Consent elements</a:t>
+            </a:r>
+          </a:p>
+          <a:p>
+            <a:pPr lvl="2"/>
+            <a:r>
+              <a:rPr/>
+              <a:t>Authorization</a:t>
             </a:r>
           </a:p>
         </p:txBody>
@@ -5253,45 +5090,12 @@
           <a:bodyPr/>
           <a:lstStyle/>
           <a:p>
-            <a:pPr lvl="1"/>
-            <a:r>
-              <a:rPr/>
-              <a:t>Training ?</a:t>
-            </a:r>
-          </a:p>
-          <a:p>
-            <a:pPr lvl="2"/>
-            <a:r>
-              <a:rPr/>
-              <a:t>CITI training ? used by multiple institutions</a:t>
-            </a:r>
-          </a:p>
-          <a:p>
-            <a:pPr lvl="1"/>
-            <a:r>
-              <a:rPr/>
-              <a:t>IRBs ?</a:t>
-            </a:r>
-          </a:p>
-          <a:p>
-            <a:pPr lvl="2"/>
-            <a:r>
-              <a:rPr/>
-              <a:t>UMKC IRB</a:t>
-            </a:r>
-          </a:p>
-          <a:p>
-            <a:pPr lvl="2"/>
-            <a:r>
-              <a:rPr/>
-              <a:t>IRBs at other institutions (CMH, St. Luke?s ?)</a:t>
-            </a:r>
-          </a:p>
-          <a:p>
-            <a:pPr lvl="1"/>
-            <a:r>
-              <a:rPr/>
-              <a:t>Research committees ?</a:t>
+            <a:pPr lvl="0" marL="0" indent="0">
+              <a:buNone/>
+            </a:pPr>
+            <a:r>
+              <a:rPr/>
+              <a:t>Portney &amp; Watkins, 2009.</a:t>
             </a:r>
           </a:p>
         </p:txBody>
@@ -5318,142 +5122,36 @@
           <a:chExt cx="0" cy="0"/>
         </a:xfrm>
       </p:grpSpPr>
-      <p:sp>
-        <p:nvSpPr>
-          <p:cNvPr id="2" name="Title 1"/>
-          <p:cNvSpPr>
-            <a:spLocks noGrp="1"/>
-          </p:cNvSpPr>
-          <p:nvPr>
-            <p:ph type="title"/>
-          </p:nvPr>
-        </p:nvSpPr>
-        <p:spPr/>
-        <p:txBody>
-          <a:bodyPr/>
-          <a:lstStyle/>
-          <a:p>
-            <a:pPr lvl="0" marL="0" indent="0">
-              <a:buNone/>
-            </a:pPr>
-            <a:r>
-              <a:rPr/>
-              <a:t>Assignment</a:t>
-            </a:r>
-            <a:r>
-              <a:rPr/>
-              <a:t> </a:t>
-            </a:r>
-            <a:r>
-              <a:rPr/>
-              <a:t>#1</a:t>
-            </a:r>
-          </a:p>
-        </p:txBody>
-      </p:sp>
-      <p:sp>
-        <p:nvSpPr>
-          <p:cNvPr id="3" name="Content Placeholder 2"/>
-          <p:cNvSpPr>
-            <a:spLocks noGrp="1"/>
-          </p:cNvSpPr>
-          <p:nvPr>
-            <p:ph idx="1"/>
-          </p:nvPr>
-        </p:nvSpPr>
-        <p:spPr/>
-        <p:txBody>
-          <a:bodyPr/>
-          <a:lstStyle/>
-          <a:p>
-            <a:pPr lvl="1"/>
-            <a:r>
-              <a:rPr/>
-              <a:t>Complete the UMKC IRB training.</a:t>
-            </a:r>
-          </a:p>
-          <a:p>
-            <a:pPr lvl="1"/>
-            <a:r>
-              <a:rPr/>
-              <a:t>Get to this from the UMKC Research Support page</a:t>
-            </a:r>
-          </a:p>
-          <a:p>
-            <a:pPr lvl="1"/>
-            <a:r>
-              <a:rPr>
-                <a:hlinkClick r:id="rId2"/>
-              </a:rPr>
-              <a:t>http://www.umkc.edu/ors/irb/training.cfm</a:t>
-            </a:r>
-          </a:p>
-          <a:p>
-            <a:pPr lvl="1"/>
-            <a:r>
-              <a:rPr>
-                <a:hlinkClick r:id="rId3"/>
-              </a:rPr>
-              <a:t>http://www.citiprogram.org/</a:t>
-            </a:r>
-          </a:p>
-          <a:p>
-            <a:pPr lvl="1"/>
-            <a:r>
-              <a:rPr/>
-              <a:t>Select ?Group 1 ? Biomedical Investigator?</a:t>
-            </a:r>
-          </a:p>
-          <a:p>
-            <a:pPr lvl="1"/>
-            <a:r>
-              <a:rPr/>
-              <a:t>Send a copy of the Certificate of Completion to Dr. Gerkovich ( </a:t>
-            </a:r>
-            <a:r>
-              <a:rPr>
-                <a:hlinkClick r:id="rId4"/>
-              </a:rPr>
-              <a:t>gerkovichm@umkc.edu</a:t>
-            </a:r>
-            <a:r>
-              <a:rPr/>
-              <a:t> ); this copy will be kept by me so make sure to also print out a copy for your own file.</a:t>
-            </a:r>
-          </a:p>
-          <a:p>
-            <a:pPr lvl="0" marL="0" indent="0">
-              <a:buNone/>
-            </a:pPr>
-            <a:r>
-              <a:rPr>
-                <a:hlinkClick r:id="rId5"/>
-              </a:rPr>
-              <a:t>http://www.umkc.edu/ors/irb/training.cfm</a:t>
-            </a:r>
-            <a:r>
-              <a:rPr/>
-              <a:t> </a:t>
-            </a:r>
-            <a:r>
-              <a:rPr>
-                <a:hlinkClick r:id="rId6"/>
-              </a:rPr>
-              <a:t>http://www.citiprogram.org/</a:t>
-            </a:r>
-            <a:r>
-              <a:rPr/>
-              <a:t> </a:t>
-            </a:r>
-            <a:r>
-              <a:rPr>
-                <a:hlinkClick r:id="rId7"/>
-              </a:rPr>
-              <a:t>gerkovichm@umkc.edu</a:t>
-            </a:r>
-          </a:p>
-        </p:txBody>
-      </p:sp>
+      <p:pic>
+        <p:nvPicPr>
+          <p:cNvPr descr="../images/image-02-05.png" id="0" name="Picture 1"/>
+          <p:cNvPicPr>
+            <a:picLocks noGrp="1" noChangeAspect="1"/>
+          </p:cNvPicPr>
+          <p:nvPr/>
+        </p:nvPicPr>
+        <p:blipFill>
+          <a:blip r:embed="rId2"/>
+          <a:stretch>
+            <a:fillRect/>
+          </a:stretch>
+        </p:blipFill>
+        <p:spPr bwMode="auto">
+          <a:xfrm>
+            <a:off x="2527300" y="1600200"/>
+            <a:ext cx="4089400" cy="4521200"/>
+          </a:xfrm>
+          <a:prstGeom prst="rect">
+            <a:avLst/>
+          </a:prstGeom>
+          <a:noFill/>
+          <a:ln w="9525">
+            <a:noFill/>
+            <a:headEnd/>
+            <a:tailEnd/>
+          </a:ln>
+        </p:spPr>
+      </p:pic>
     </p:spTree>
   </p:cSld>
 </p:sld>
@@ -5478,12 +5176,12 @@
       </p:grpSpPr>
       <p:sp>
         <p:nvSpPr>
-          <p:cNvPr id="2" name="Title 1"/>
-          <p:cNvSpPr>
-            <a:spLocks noGrp="1"/>
-          </p:cNvSpPr>
-          <p:nvPr>
-            <p:ph type="title"/>
+          <p:cNvPr id="3" name="Content Placeholder 2"/>
+          <p:cNvSpPr>
+            <a:spLocks noGrp="1"/>
+          </p:cNvSpPr>
+          <p:nvPr>
+            <p:ph idx="1"/>
           </p:nvPr>
         </p:nvSpPr>
         <p:spPr/>
@@ -5496,71 +5194,70 @@
             </a:pPr>
             <a:r>
               <a:rPr/>
-              <a:t>Assignment</a:t>
-            </a:r>
-          </a:p>
-        </p:txBody>
-      </p:sp>
-      <p:sp>
-        <p:nvSpPr>
-          <p:cNvPr id="3" name="Content Placeholder 2"/>
-          <p:cNvSpPr>
-            <a:spLocks noGrp="1"/>
-          </p:cNvSpPr>
-          <p:nvPr>
-            <p:ph idx="1"/>
-          </p:nvPr>
-        </p:nvSpPr>
-        <p:spPr/>
-        <p:txBody>
-          <a:bodyPr/>
-          <a:lstStyle/>
-          <a:p>
-            <a:pPr lvl="1">
-              <a:buAutoNum type="arabicPeriod"/>
-            </a:pPr>
-            <a:r>
-              <a:rPr/>
-              <a:t>Complete the UMKC IRB training. Get to this from the </a:t>
-            </a:r>
-            <a:r>
-              <a:rPr>
-                <a:hlinkClick r:id="rId2"/>
-              </a:rPr>
-              <a:t>UMKC Research Support page</a:t>
-            </a:r>
-            <a:r>
-              <a:rPr/>
-              <a:t>, or directly by registering on the </a:t>
-            </a:r>
-            <a:r>
-              <a:rPr>
-                <a:hlinkClick r:id="rId3"/>
-              </a:rPr>
-              <a:t>CITI Program web site</a:t>
-            </a:r>
-            <a:r>
-              <a:rPr/>
-              <a:t>. Select “Group 1 - Biomedical Investigator”. Send a copy of the Certificate of Completion to Dr. Simon (</a:t>
-            </a:r>
-            <a:r>
-              <a:rPr>
-                <a:hlinkClick r:id="rId4"/>
-              </a:rPr>
-              <a:t>simons@umkc.edu</a:t>
-            </a:r>
-            <a:r>
-              <a:rPr/>
-              <a:t>); this copy will be kept by the instructor so make sure to also print out a copy for your own file. Certificate must be submitted by midnight, Wednesday 1/31/2018 to be eligible to receive full credit.</a:t>
-            </a:r>
-          </a:p>
-          <a:p>
-            <a:pPr lvl="1">
-              <a:buAutoNum type="arabicPeriod"/>
-            </a:pPr>
-            <a:r>
-              <a:rPr/>
-              <a:t>Prepare for next week’s session</a:t>
+              <a:t> *** ### Research Ethics</a:t>
+            </a:r>
+          </a:p>
+          <a:p>
+            <a:pPr lvl="1"/>
+            <a:r>
+              <a:rPr/>
+              <a:t>Other research ethics issues</a:t>
+            </a:r>
+          </a:p>
+          <a:p>
+            <a:pPr lvl="2"/>
+            <a:r>
+              <a:rPr/>
+              <a:t>Scientific misconduct</a:t>
+            </a:r>
+          </a:p>
+          <a:p>
+            <a:pPr lvl="2"/>
+            <a:r>
+              <a:rPr/>
+              <a:t>Conflict of interest</a:t>
+            </a:r>
+          </a:p>
+          <a:p>
+            <a:pPr lvl="2"/>
+            <a:r>
+              <a:rPr/>
+              <a:t>Reporting research results</a:t>
+            </a:r>
+          </a:p>
+          <a:p>
+            <a:pPr lvl="3"/>
+            <a:r>
+              <a:rPr/>
+              <a:t>Plagiarism</a:t>
+            </a:r>
+          </a:p>
+          <a:p>
+            <a:pPr lvl="3"/>
+            <a:r>
+              <a:rPr/>
+              <a:t>Duplication</a:t>
+            </a:r>
+          </a:p>
+          <a:p>
+            <a:pPr lvl="3"/>
+            <a:r>
+              <a:rPr/>
+              <a:t>Fragmentation</a:t>
+            </a:r>
+          </a:p>
+          <a:p>
+            <a:pPr lvl="3"/>
+            <a:r>
+              <a:rPr/>
+              <a:t>Authorship</a:t>
+            </a:r>
+          </a:p>
+          <a:p>
+            <a:pPr lvl="2"/>
+            <a:r>
+              <a:rPr/>
+              <a:t>Use of animals in research</a:t>
             </a:r>
           </a:p>
         </p:txBody>
@@ -5607,7 +5304,7 @@
             </a:pPr>
             <a:r>
               <a:rPr/>
-              <a:t>Discussion</a:t>
+              <a:t>Research</a:t>
             </a:r>
             <a:r>
               <a:rPr/>
@@ -5615,7 +5312,7 @@
             </a:r>
             <a:r>
               <a:rPr/>
-              <a:t>questions</a:t>
+              <a:t>Ethics</a:t>
             </a:r>
           </a:p>
         </p:txBody>
@@ -5635,39 +5332,38 @@
           <a:bodyPr/>
           <a:lstStyle/>
           <a:p>
-            <a:pPr lvl="0" marL="0" indent="0">
-              <a:buNone/>
-            </a:pPr>
-            <a:r>
-              <a:rPr/>
-              <a:t>Please submit your posts by Friday, February 01, 2019 and comment on at least one other post by the following Wednesday.</a:t>
-            </a:r>
-          </a:p>
-          <a:p>
-            <a:pPr lvl="1">
-              <a:buAutoNum type="arabicPeriod"/>
-            </a:pPr>
-            <a:r>
-              <a:rPr/>
-              <a:t>How will you go about deciding on a research project?</a:t>
-            </a:r>
-          </a:p>
-          <a:p>
-            <a:pPr lvl="1">
-              <a:buAutoNum type="arabicPeriod"/>
-            </a:pPr>
-            <a:r>
-              <a:rPr/>
-              <a:t>How will you decide whether you will be proposing research questions or hypotheses?</a:t>
-            </a:r>
-          </a:p>
-          <a:p>
-            <a:pPr lvl="1">
-              <a:buAutoNum type="arabicPeriod"/>
-            </a:pPr>
-            <a:r>
-              <a:rPr/>
-              <a:t>What will you need to take into account in order to make sure you are conducting research in an ethical and responsible manner?</a:t>
+            <a:pPr lvl="1"/>
+            <a:r>
+              <a:rPr/>
+              <a:t>NIH definition (NIH Catalyst, 2001)</a:t>
+            </a:r>
+          </a:p>
+          <a:p>
+            <a:pPr lvl="1"/>
+            <a:r>
+              <a:rPr/>
+              <a:t>Scientific/research misconduct is ?</a:t>
+            </a:r>
+          </a:p>
+          <a:p>
+            <a:pPr lvl="2"/>
+            <a:r>
+              <a:rPr/>
+              <a:t>Fabrication ? inventing data or results</a:t>
+            </a:r>
+          </a:p>
+          <a:p>
+            <a:pPr lvl="2"/>
+            <a:r>
+              <a:rPr/>
+              <a:t>Falsification ? manipulating research materials, equipment, or processes, or changing or omitting data or results</a:t>
+            </a:r>
+          </a:p>
+          <a:p>
+            <a:pPr lvl="2"/>
+            <a:r>
+              <a:rPr/>
+              <a:t>Plagiarism ? appropriation of ideas, processes, results, or words of another person without giving appropriate credit</a:t>
             </a:r>
           </a:p>
         </p:txBody>
@@ -5714,7 +5410,7 @@
             </a:pPr>
             <a:r>
               <a:rPr/>
-              <a:t>Additional</a:t>
+              <a:t>Research</a:t>
             </a:r>
             <a:r>
               <a:rPr/>
@@ -5722,7 +5418,65 @@
             </a:r>
             <a:r>
               <a:rPr/>
-              <a:t>slides</a:t>
+              <a:t>Ethics</a:t>
+            </a:r>
+          </a:p>
+        </p:txBody>
+      </p:sp>
+      <p:sp>
+        <p:nvSpPr>
+          <p:cNvPr id="3" name="Content Placeholder 2"/>
+          <p:cNvSpPr>
+            <a:spLocks noGrp="1"/>
+          </p:cNvSpPr>
+          <p:nvPr>
+            <p:ph idx="1"/>
+          </p:nvPr>
+        </p:nvSpPr>
+        <p:spPr/>
+        <p:txBody>
+          <a:bodyPr/>
+          <a:lstStyle/>
+          <a:p>
+            <a:pPr lvl="1"/>
+            <a:r>
+              <a:rPr/>
+              <a:t>Training ?</a:t>
+            </a:r>
+          </a:p>
+          <a:p>
+            <a:pPr lvl="2"/>
+            <a:r>
+              <a:rPr/>
+              <a:t>CITI training ? used by multiple institutions</a:t>
+            </a:r>
+          </a:p>
+          <a:p>
+            <a:pPr lvl="1"/>
+            <a:r>
+              <a:rPr/>
+              <a:t>IRBs ?</a:t>
+            </a:r>
+          </a:p>
+          <a:p>
+            <a:pPr lvl="2"/>
+            <a:r>
+              <a:rPr/>
+              <a:t>UMKC IRB</a:t>
+            </a:r>
+          </a:p>
+          <a:p>
+            <a:pPr lvl="2"/>
+            <a:r>
+              <a:rPr/>
+              <a:t>IRBs at other institutions (CMH, St. Luke?s ?)</a:t>
+            </a:r>
+          </a:p>
+          <a:p>
+            <a:pPr lvl="1"/>
+            <a:r>
+              <a:rPr/>
+              <a:t>Research committees ?</a:t>
             </a:r>
           </a:p>
         </p:txBody>
@@ -5821,6 +5575,437 @@
 </p:sld>
 </file>
 
+<file path=ppt/slides/slide30.xml><?xml version="1.0" encoding="utf-8"?>
+<p:sld xmlns:a="http://schemas.openxmlformats.org/drawingml/2006/main" xmlns:r="http://schemas.openxmlformats.org/officeDocument/2006/relationships" xmlns:p="http://schemas.openxmlformats.org/presentationml/2006/main">
+  <p:cSld>
+    <p:spTree>
+      <p:nvGrpSpPr>
+        <p:cNvPr id="1" name=""/>
+        <p:cNvGrpSpPr/>
+        <p:nvPr/>
+      </p:nvGrpSpPr>
+      <p:grpSpPr>
+        <a:xfrm>
+          <a:off x="0" y="0"/>
+          <a:ext cx="0" cy="0"/>
+          <a:chOff x="0" y="0"/>
+          <a:chExt cx="0" cy="0"/>
+        </a:xfrm>
+      </p:grpSpPr>
+      <p:sp>
+        <p:nvSpPr>
+          <p:cNvPr id="2" name="Title 1"/>
+          <p:cNvSpPr>
+            <a:spLocks noGrp="1"/>
+          </p:cNvSpPr>
+          <p:nvPr>
+            <p:ph type="title"/>
+          </p:nvPr>
+        </p:nvSpPr>
+        <p:spPr/>
+        <p:txBody>
+          <a:bodyPr/>
+          <a:lstStyle/>
+          <a:p>
+            <a:pPr lvl="0" marL="0" indent="0">
+              <a:buNone/>
+            </a:pPr>
+            <a:r>
+              <a:rPr/>
+              <a:t>Assignment</a:t>
+            </a:r>
+            <a:r>
+              <a:rPr/>
+              <a:t> </a:t>
+            </a:r>
+            <a:r>
+              <a:rPr/>
+              <a:t>#1</a:t>
+            </a:r>
+          </a:p>
+        </p:txBody>
+      </p:sp>
+      <p:sp>
+        <p:nvSpPr>
+          <p:cNvPr id="3" name="Content Placeholder 2"/>
+          <p:cNvSpPr>
+            <a:spLocks noGrp="1"/>
+          </p:cNvSpPr>
+          <p:nvPr>
+            <p:ph idx="1"/>
+          </p:nvPr>
+        </p:nvSpPr>
+        <p:spPr/>
+        <p:txBody>
+          <a:bodyPr/>
+          <a:lstStyle/>
+          <a:p>
+            <a:pPr lvl="1"/>
+            <a:r>
+              <a:rPr/>
+              <a:t>Complete the UMKC IRB training.</a:t>
+            </a:r>
+          </a:p>
+          <a:p>
+            <a:pPr lvl="1"/>
+            <a:r>
+              <a:rPr/>
+              <a:t>Get to this from the UMKC Research Support page</a:t>
+            </a:r>
+          </a:p>
+          <a:p>
+            <a:pPr lvl="1"/>
+            <a:r>
+              <a:rPr>
+                <a:hlinkClick r:id="rId2"/>
+              </a:rPr>
+              <a:t>http://www.umkc.edu/ors/irb/training.cfm</a:t>
+            </a:r>
+          </a:p>
+          <a:p>
+            <a:pPr lvl="1"/>
+            <a:r>
+              <a:rPr>
+                <a:hlinkClick r:id="rId3"/>
+              </a:rPr>
+              <a:t>http://www.citiprogram.org/</a:t>
+            </a:r>
+          </a:p>
+          <a:p>
+            <a:pPr lvl="1"/>
+            <a:r>
+              <a:rPr/>
+              <a:t>Select ?Group 1 ? Biomedical Investigator?</a:t>
+            </a:r>
+          </a:p>
+          <a:p>
+            <a:pPr lvl="1"/>
+            <a:r>
+              <a:rPr/>
+              <a:t>Send a copy of the Certificate of Completion to Dr. Gerkovich ( </a:t>
+            </a:r>
+            <a:r>
+              <a:rPr>
+                <a:hlinkClick r:id="rId4"/>
+              </a:rPr>
+              <a:t>gerkovichm@umkc.edu</a:t>
+            </a:r>
+            <a:r>
+              <a:rPr/>
+              <a:t> ); this copy will be kept by me so make sure to also print out a copy for your own file.</a:t>
+            </a:r>
+          </a:p>
+          <a:p>
+            <a:pPr lvl="0" marL="0" indent="0">
+              <a:buNone/>
+            </a:pPr>
+            <a:r>
+              <a:rPr>
+                <a:hlinkClick r:id="rId5"/>
+              </a:rPr>
+              <a:t>http://www.umkc.edu/ors/irb/training.cfm</a:t>
+            </a:r>
+            <a:r>
+              <a:rPr/>
+              <a:t> </a:t>
+            </a:r>
+            <a:r>
+              <a:rPr>
+                <a:hlinkClick r:id="rId6"/>
+              </a:rPr>
+              <a:t>http://www.citiprogram.org/</a:t>
+            </a:r>
+            <a:r>
+              <a:rPr/>
+              <a:t> </a:t>
+            </a:r>
+            <a:r>
+              <a:rPr>
+                <a:hlinkClick r:id="rId7"/>
+              </a:rPr>
+              <a:t>gerkovichm@umkc.edu</a:t>
+            </a:r>
+          </a:p>
+        </p:txBody>
+      </p:sp>
+    </p:spTree>
+  </p:cSld>
+</p:sld>
+</file>
+
+<file path=ppt/slides/slide31.xml><?xml version="1.0" encoding="utf-8"?>
+<p:sld xmlns:a="http://schemas.openxmlformats.org/drawingml/2006/main" xmlns:r="http://schemas.openxmlformats.org/officeDocument/2006/relationships" xmlns:p="http://schemas.openxmlformats.org/presentationml/2006/main">
+  <p:cSld>
+    <p:spTree>
+      <p:nvGrpSpPr>
+        <p:cNvPr id="1" name=""/>
+        <p:cNvGrpSpPr/>
+        <p:nvPr/>
+      </p:nvGrpSpPr>
+      <p:grpSpPr>
+        <a:xfrm>
+          <a:off x="0" y="0"/>
+          <a:ext cx="0" cy="0"/>
+          <a:chOff x="0" y="0"/>
+          <a:chExt cx="0" cy="0"/>
+        </a:xfrm>
+      </p:grpSpPr>
+      <p:sp>
+        <p:nvSpPr>
+          <p:cNvPr id="2" name="Title 1"/>
+          <p:cNvSpPr>
+            <a:spLocks noGrp="1"/>
+          </p:cNvSpPr>
+          <p:nvPr>
+            <p:ph type="title"/>
+          </p:nvPr>
+        </p:nvSpPr>
+        <p:spPr/>
+        <p:txBody>
+          <a:bodyPr/>
+          <a:lstStyle/>
+          <a:p>
+            <a:pPr lvl="0" marL="0" indent="0">
+              <a:buNone/>
+            </a:pPr>
+            <a:r>
+              <a:rPr/>
+              <a:t>Assignment</a:t>
+            </a:r>
+          </a:p>
+        </p:txBody>
+      </p:sp>
+      <p:sp>
+        <p:nvSpPr>
+          <p:cNvPr id="3" name="Content Placeholder 2"/>
+          <p:cNvSpPr>
+            <a:spLocks noGrp="1"/>
+          </p:cNvSpPr>
+          <p:nvPr>
+            <p:ph idx="1"/>
+          </p:nvPr>
+        </p:nvSpPr>
+        <p:spPr/>
+        <p:txBody>
+          <a:bodyPr/>
+          <a:lstStyle/>
+          <a:p>
+            <a:pPr lvl="1">
+              <a:buAutoNum type="arabicPeriod"/>
+            </a:pPr>
+            <a:r>
+              <a:rPr/>
+              <a:t>Complete the UMKC IRB training. Get to this from the </a:t>
+            </a:r>
+            <a:r>
+              <a:rPr>
+                <a:hlinkClick r:id="rId2"/>
+              </a:rPr>
+              <a:t>UMKC Research Support page</a:t>
+            </a:r>
+            <a:r>
+              <a:rPr/>
+              <a:t>, or directly by registering on the </a:t>
+            </a:r>
+            <a:r>
+              <a:rPr>
+                <a:hlinkClick r:id="rId3"/>
+              </a:rPr>
+              <a:t>CITI Program web site</a:t>
+            </a:r>
+            <a:r>
+              <a:rPr/>
+              <a:t>. Select “Group 1 - Biomedical Investigator”. Send a copy of the Certificate of Completion to Dr. Simon (</a:t>
+            </a:r>
+            <a:r>
+              <a:rPr>
+                <a:hlinkClick r:id="rId4"/>
+              </a:rPr>
+              <a:t>simons@umkc.edu</a:t>
+            </a:r>
+            <a:r>
+              <a:rPr/>
+              <a:t>); this copy will be kept by the instructor so make sure to also print out a copy for your own file. Certificate must be submitted by midnight, Wednesday 1/31/2018 to be eligible to receive full credit.</a:t>
+            </a:r>
+          </a:p>
+          <a:p>
+            <a:pPr lvl="1">
+              <a:buAutoNum type="arabicPeriod"/>
+            </a:pPr>
+            <a:r>
+              <a:rPr/>
+              <a:t>Prepare for next week’s session</a:t>
+            </a:r>
+          </a:p>
+        </p:txBody>
+      </p:sp>
+    </p:spTree>
+  </p:cSld>
+</p:sld>
+</file>
+
+<file path=ppt/slides/slide32.xml><?xml version="1.0" encoding="utf-8"?>
+<p:sld xmlns:a="http://schemas.openxmlformats.org/drawingml/2006/main" xmlns:r="http://schemas.openxmlformats.org/officeDocument/2006/relationships" xmlns:p="http://schemas.openxmlformats.org/presentationml/2006/main">
+  <p:cSld>
+    <p:spTree>
+      <p:nvGrpSpPr>
+        <p:cNvPr id="1" name=""/>
+        <p:cNvGrpSpPr/>
+        <p:nvPr/>
+      </p:nvGrpSpPr>
+      <p:grpSpPr>
+        <a:xfrm>
+          <a:off x="0" y="0"/>
+          <a:ext cx="0" cy="0"/>
+          <a:chOff x="0" y="0"/>
+          <a:chExt cx="0" cy="0"/>
+        </a:xfrm>
+      </p:grpSpPr>
+      <p:sp>
+        <p:nvSpPr>
+          <p:cNvPr id="2" name="Title 1"/>
+          <p:cNvSpPr>
+            <a:spLocks noGrp="1"/>
+          </p:cNvSpPr>
+          <p:nvPr>
+            <p:ph type="title"/>
+          </p:nvPr>
+        </p:nvSpPr>
+        <p:spPr/>
+        <p:txBody>
+          <a:bodyPr/>
+          <a:lstStyle/>
+          <a:p>
+            <a:pPr lvl="0" marL="0" indent="0">
+              <a:buNone/>
+            </a:pPr>
+            <a:r>
+              <a:rPr/>
+              <a:t>Discussion</a:t>
+            </a:r>
+            <a:r>
+              <a:rPr/>
+              <a:t> </a:t>
+            </a:r>
+            <a:r>
+              <a:rPr/>
+              <a:t>questions</a:t>
+            </a:r>
+          </a:p>
+        </p:txBody>
+      </p:sp>
+      <p:sp>
+        <p:nvSpPr>
+          <p:cNvPr id="3" name="Content Placeholder 2"/>
+          <p:cNvSpPr>
+            <a:spLocks noGrp="1"/>
+          </p:cNvSpPr>
+          <p:nvPr>
+            <p:ph idx="1"/>
+          </p:nvPr>
+        </p:nvSpPr>
+        <p:spPr/>
+        <p:txBody>
+          <a:bodyPr/>
+          <a:lstStyle/>
+          <a:p>
+            <a:pPr lvl="0" marL="0" indent="0">
+              <a:buNone/>
+            </a:pPr>
+            <a:r>
+              <a:rPr/>
+              <a:t>Please submit your posts by Friday, February 01, 2019 and comment on at least one other post by the following Wednesday.</a:t>
+            </a:r>
+          </a:p>
+          <a:p>
+            <a:pPr lvl="1">
+              <a:buAutoNum type="arabicPeriod"/>
+            </a:pPr>
+            <a:r>
+              <a:rPr/>
+              <a:t>How will you go about deciding on a research project?</a:t>
+            </a:r>
+          </a:p>
+          <a:p>
+            <a:pPr lvl="1">
+              <a:buAutoNum type="arabicPeriod"/>
+            </a:pPr>
+            <a:r>
+              <a:rPr/>
+              <a:t>How will you decide whether you will be proposing research questions or hypotheses?</a:t>
+            </a:r>
+          </a:p>
+          <a:p>
+            <a:pPr lvl="1">
+              <a:buAutoNum type="arabicPeriod"/>
+            </a:pPr>
+            <a:r>
+              <a:rPr/>
+              <a:t>What will you need to take into account in order to make sure you are conducting research in an ethical and responsible manner?</a:t>
+            </a:r>
+          </a:p>
+        </p:txBody>
+      </p:sp>
+    </p:spTree>
+  </p:cSld>
+</p:sld>
+</file>
+
+<file path=ppt/slides/slide33.xml><?xml version="1.0" encoding="utf-8"?>
+<p:sld xmlns:a="http://schemas.openxmlformats.org/drawingml/2006/main" xmlns:r="http://schemas.openxmlformats.org/officeDocument/2006/relationships" xmlns:p="http://schemas.openxmlformats.org/presentationml/2006/main">
+  <p:cSld>
+    <p:spTree>
+      <p:nvGrpSpPr>
+        <p:cNvPr id="1" name=""/>
+        <p:cNvGrpSpPr/>
+        <p:nvPr/>
+      </p:nvGrpSpPr>
+      <p:grpSpPr>
+        <a:xfrm>
+          <a:off x="0" y="0"/>
+          <a:ext cx="0" cy="0"/>
+          <a:chOff x="0" y="0"/>
+          <a:chExt cx="0" cy="0"/>
+        </a:xfrm>
+      </p:grpSpPr>
+      <p:sp>
+        <p:nvSpPr>
+          <p:cNvPr id="2" name="Title 1"/>
+          <p:cNvSpPr>
+            <a:spLocks noGrp="1"/>
+          </p:cNvSpPr>
+          <p:nvPr>
+            <p:ph type="title"/>
+          </p:nvPr>
+        </p:nvSpPr>
+        <p:spPr/>
+        <p:txBody>
+          <a:bodyPr/>
+          <a:lstStyle/>
+          <a:p>
+            <a:pPr lvl="0" marL="0" indent="0">
+              <a:buNone/>
+            </a:pPr>
+            <a:r>
+              <a:rPr/>
+              <a:t>Additional</a:t>
+            </a:r>
+            <a:r>
+              <a:rPr/>
+              <a:t> </a:t>
+            </a:r>
+            <a:r>
+              <a:rPr/>
+              <a:t>slides</a:t>
+            </a:r>
+          </a:p>
+        </p:txBody>
+      </p:sp>
+    </p:spTree>
+  </p:cSld>
+</p:sld>
+</file>
+
 <file path=ppt/slides/slide4.xml><?xml version="1.0" encoding="utf-8"?>
 <p:sld xmlns:a="http://schemas.openxmlformats.org/drawingml/2006/main" xmlns:r="http://schemas.openxmlformats.org/officeDocument/2006/relationships" xmlns:p="http://schemas.openxmlformats.org/presentationml/2006/main">
   <p:cSld>
@@ -5976,31 +6161,36 @@
           </a:p>
         </p:txBody>
       </p:sp>
-      <p:sp>
-        <p:nvSpPr>
-          <p:cNvPr id="3" name="Content Placeholder 2"/>
-          <p:cNvSpPr>
-            <a:spLocks noGrp="1"/>
-          </p:cNvSpPr>
-          <p:nvPr>
-            <p:ph idx="1"/>
-          </p:nvPr>
-        </p:nvSpPr>
-        <p:spPr/>
-        <p:txBody>
-          <a:bodyPr/>
-          <a:lstStyle/>
-          <a:p>
-            <a:pPr lvl="0" marL="0" indent="0">
-              <a:buNone/>
-            </a:pPr>
-            <a:r>
-              <a:rPr/>
-              <a:t>(assets/img/image1.png)</a:t>
-            </a:r>
-          </a:p>
-        </p:txBody>
-      </p:sp>
+      <p:pic>
+        <p:nvPicPr>
+          <p:cNvPr descr="../images/image-02-01.png" id="0" name="Picture 1"/>
+          <p:cNvPicPr>
+            <a:picLocks noGrp="1" noChangeAspect="1"/>
+          </p:cNvPicPr>
+          <p:nvPr/>
+        </p:nvPicPr>
+        <p:blipFill>
+          <a:blip r:embed="rId2"/>
+          <a:stretch>
+            <a:fillRect/>
+          </a:stretch>
+        </p:blipFill>
+        <p:spPr bwMode="auto">
+          <a:xfrm>
+            <a:off x="2781300" y="1600200"/>
+            <a:ext cx="3581400" cy="4521200"/>
+          </a:xfrm>
+          <a:prstGeom prst="rect">
+            <a:avLst/>
+          </a:prstGeom>
+          <a:noFill/>
+          <a:ln w="9525">
+            <a:noFill/>
+            <a:headEnd/>
+            <a:tailEnd/>
+          </a:ln>
+        </p:spPr>
+      </p:pic>
     </p:spTree>
   </p:cSld>
 </p:sld>

</xml_diff>